<commit_message>
updated submission notebooks with img/;
</commit_message>
<xml_diff>
--- a/PROJECT_README.pptx
+++ b/PROJECT_README.pptx
@@ -245,7 +245,7 @@
           <a:p>
             <a:fld id="{D6B7C6C1-58CA-4905-AEDC-9C13740575B8}" type="datetimeFigureOut">
               <a:rPr lang="en-SG" smtClean="0"/>
-              <a:t>12/4/2020</a:t>
+              <a:t>16/4/2020</a:t>
             </a:fld>
             <a:endParaRPr lang="en-SG"/>
           </a:p>
@@ -3835,7 +3835,7 @@
         <p:spPr>
           <a:xfrm>
             <a:off x="609600" y="1295400"/>
-            <a:ext cx="10972800" cy="2456057"/>
+            <a:ext cx="10972800" cy="3490186"/>
           </a:xfrm>
         </p:spPr>
         <p:txBody>
@@ -3860,8 +3860,9 @@
             </a:r>
             <a:r>
               <a:rPr lang="en-US" b="1" dirty="0" smtClean="0"/>
-              <a:t>scripts/project_description.pptx</a:t>
-            </a:r>
+              <a:t>project_description.pptx</a:t>
+            </a:r>
+            <a:endParaRPr lang="en-US" b="1" dirty="0" smtClean="0"/>
           </a:p>
           <a:p>
             <a:r>
@@ -3915,6 +3916,28 @@
             <a:pPr lvl="1"/>
             <a:r>
               <a:rPr lang="en-US" dirty="0" smtClean="0"/>
+              <a:t>The training data is too big to fit on Google Drive (56GB)</a:t>
+            </a:r>
+          </a:p>
+          <a:p>
+            <a:pPr lvl="2"/>
+            <a:r>
+              <a:rPr lang="en-US" dirty="0" smtClean="0"/>
+              <a:t>Raw audio files (36GB)</a:t>
+            </a:r>
+          </a:p>
+          <a:p>
+            <a:pPr lvl="2"/>
+            <a:r>
+              <a:rPr lang="en-US" dirty="0" smtClean="0"/>
+              <a:t>Transformed audio spectrograms (20GB)</a:t>
+            </a:r>
+            <a:endParaRPr lang="en-US" dirty="0" smtClean="0"/>
+          </a:p>
+          <a:p>
+            <a:pPr lvl="1"/>
+            <a:r>
+              <a:rPr lang="en-US" dirty="0" smtClean="0"/>
               <a:t>Keep the notebooks as it is to preserve the training outputs</a:t>
             </a:r>
             <a:r>
@@ -3925,11 +3948,6 @@
               </a:rPr>
               <a:t> </a:t>
             </a:r>
-            <a:endParaRPr lang="en-US" dirty="0" smtClean="0">
-              <a:solidFill>
-                <a:srgbClr val="C00000"/>
-              </a:solidFill>
-            </a:endParaRPr>
           </a:p>
           <a:p>
             <a:r>
@@ -5280,21 +5298,6 @@
 </file>
 
 <file path=customXml/item1.xml><?xml version="1.0" encoding="utf-8"?>
-<p:properties xmlns:p="http://schemas.microsoft.com/office/2006/metadata/properties" xmlns:xsi="http://www.w3.org/2001/XMLSchema-instance" xmlns:pc="http://schemas.microsoft.com/office/infopath/2007/PartnerControls">
-  <documentManagement/>
-</p:properties>
-</file>
-
-<file path=customXml/item2.xml><?xml version="1.0" encoding="utf-8"?>
-<?mso-contentType ?>
-<FormTemplates xmlns="http://schemas.microsoft.com/sharepoint/v3/contenttype/forms">
-  <Display>DocumentLibraryForm</Display>
-  <Edit>DocumentLibraryForm</Edit>
-  <New>DocumentLibraryForm</New>
-</FormTemplates>
-</file>
-
-<file path=customXml/item3.xml><?xml version="1.0" encoding="utf-8"?>
 <ct:contentTypeSchema xmlns:ct="http://schemas.microsoft.com/office/2006/metadata/contentType" xmlns:ma="http://schemas.microsoft.com/office/2006/metadata/properties/metaAttributes" ct:_="" ma:_="" ma:contentTypeName="Document" ma:contentTypeID="0x0101000C6AD1B51FFACD45B62528B91A79C429" ma:contentTypeVersion="10" ma:contentTypeDescription="Create a new document." ma:contentTypeScope="" ma:versionID="e828ba0faaf2cc806423a5a5c0c62d95">
   <xsd:schema xmlns:xsd="http://www.w3.org/2001/XMLSchema" xmlns:xs="http://www.w3.org/2001/XMLSchema" xmlns:p="http://schemas.microsoft.com/office/2006/metadata/properties" xmlns:ns2="1b6a39ee-1380-4096-9882-8248104ba7f7" xmlns:ns3="4604cec2-e769-4190-9d56-5d48f74b6442" targetNamespace="http://schemas.microsoft.com/office/2006/metadata/properties" ma:root="true" ma:fieldsID="69378bfb00cc8fac5b4194b015c4ef7e" ns2:_="" ns3:_="">
     <xsd:import namespace="1b6a39ee-1380-4096-9882-8248104ba7f7"/>
@@ -5497,32 +5500,22 @@
 </ct:contentTypeSchema>
 </file>
 
-<file path=customXml/itemProps1.xml><?xml version="1.0" encoding="utf-8"?>
-<ds:datastoreItem xmlns:ds="http://schemas.openxmlformats.org/officeDocument/2006/customXml" ds:itemID="{5CBBAFE4-31A2-4C15-860D-000A6A6238D1}">
-  <ds:schemaRefs>
-    <ds:schemaRef ds:uri="http://purl.org/dc/terms/"/>
-    <ds:schemaRef ds:uri="1b6a39ee-1380-4096-9882-8248104ba7f7"/>
-    <ds:schemaRef ds:uri="http://schemas.microsoft.com/office/2006/documentManagement/types"/>
-    <ds:schemaRef ds:uri="http://schemas.openxmlformats.org/package/2006/metadata/core-properties"/>
-    <ds:schemaRef ds:uri="http://purl.org/dc/elements/1.1/"/>
-    <ds:schemaRef ds:uri="http://schemas.microsoft.com/office/2006/metadata/properties"/>
-    <ds:schemaRef ds:uri="http://schemas.microsoft.com/office/infopath/2007/PartnerControls"/>
-    <ds:schemaRef ds:uri="4604cec2-e769-4190-9d56-5d48f74b6442"/>
-    <ds:schemaRef ds:uri="http://www.w3.org/XML/1998/namespace"/>
-    <ds:schemaRef ds:uri="http://purl.org/dc/dcmitype/"/>
-  </ds:schemaRefs>
-</ds:datastoreItem>
+<file path=customXml/item2.xml><?xml version="1.0" encoding="utf-8"?>
+<?mso-contentType ?>
+<FormTemplates xmlns="http://schemas.microsoft.com/sharepoint/v3/contenttype/forms">
+  <Display>DocumentLibraryForm</Display>
+  <Edit>DocumentLibraryForm</Edit>
+  <New>DocumentLibraryForm</New>
+</FormTemplates>
 </file>
 
-<file path=customXml/itemProps2.xml><?xml version="1.0" encoding="utf-8"?>
-<ds:datastoreItem xmlns:ds="http://schemas.openxmlformats.org/officeDocument/2006/customXml" ds:itemID="{D9C4CC1F-772F-473C-B5E8-FFA6864DF366}">
-  <ds:schemaRefs>
-    <ds:schemaRef ds:uri="http://schemas.microsoft.com/sharepoint/v3/contenttype/forms"/>
-  </ds:schemaRefs>
-</ds:datastoreItem>
+<file path=customXml/item3.xml><?xml version="1.0" encoding="utf-8"?>
+<p:properties xmlns:p="http://schemas.microsoft.com/office/2006/metadata/properties" xmlns:xsi="http://www.w3.org/2001/XMLSchema-instance" xmlns:pc="http://schemas.microsoft.com/office/infopath/2007/PartnerControls">
+  <documentManagement/>
+</p:properties>
 </file>
 
-<file path=customXml/itemProps3.xml><?xml version="1.0" encoding="utf-8"?>
+<file path=customXml/itemProps1.xml><?xml version="1.0" encoding="utf-8"?>
 <ds:datastoreItem xmlns:ds="http://schemas.openxmlformats.org/officeDocument/2006/customXml" ds:itemID="{D7604F64-8C73-4F0A-859F-D0F698CA11EE}">
   <ds:schemaRefs>
     <ds:schemaRef ds:uri="http://schemas.microsoft.com/office/2006/metadata/contentType"/>
@@ -5539,4 +5532,29 @@
     <ds:schemaRef ds:uri="http://schemas.microsoft.com/internal/obd"/>
   </ds:schemaRefs>
 </ds:datastoreItem>
+</file>
+
+<file path=customXml/itemProps2.xml><?xml version="1.0" encoding="utf-8"?>
+<ds:datastoreItem xmlns:ds="http://schemas.openxmlformats.org/officeDocument/2006/customXml" ds:itemID="{D9C4CC1F-772F-473C-B5E8-FFA6864DF366}">
+  <ds:schemaRefs>
+    <ds:schemaRef ds:uri="http://schemas.microsoft.com/sharepoint/v3/contenttype/forms"/>
+  </ds:schemaRefs>
+</ds:datastoreItem>
+</file>
+
+<file path=customXml/itemProps3.xml><?xml version="1.0" encoding="utf-8"?>
+<ds:datastoreItem xmlns:ds="http://schemas.openxmlformats.org/officeDocument/2006/customXml" ds:itemID="{5CBBAFE4-31A2-4C15-860D-000A6A6238D1}">
+  <ds:schemaRefs>
+    <ds:schemaRef ds:uri="http://purl.org/dc/terms/"/>
+    <ds:schemaRef ds:uri="1b6a39ee-1380-4096-9882-8248104ba7f7"/>
+    <ds:schemaRef ds:uri="http://schemas.microsoft.com/office/2006/documentManagement/types"/>
+    <ds:schemaRef ds:uri="http://schemas.openxmlformats.org/package/2006/metadata/core-properties"/>
+    <ds:schemaRef ds:uri="http://purl.org/dc/elements/1.1/"/>
+    <ds:schemaRef ds:uri="http://schemas.microsoft.com/office/2006/metadata/properties"/>
+    <ds:schemaRef ds:uri="http://schemas.microsoft.com/office/infopath/2007/PartnerControls"/>
+    <ds:schemaRef ds:uri="4604cec2-e769-4190-9d56-5d48f74b6442"/>
+    <ds:schemaRef ds:uri="http://www.w3.org/XML/1998/namespace"/>
+    <ds:schemaRef ds:uri="http://purl.org/dc/dcmitype/"/>
+  </ds:schemaRefs>
+</ds:datastoreItem>
 </file>
</xml_diff>